<commit_message>
updating scripts for re-analysis
</commit_message>
<xml_diff>
--- a/Images/images.pptx
+++ b/Images/images.pptx
@@ -261,7 +261,7 @@
           <a:p>
             <a:fld id="{0758383B-B3AB-4202-9ABE-1952F2F47594}" type="datetimeFigureOut">
               <a:rPr lang="en-GB" smtClean="0"/>
-              <a:t>22/02/2024</a:t>
+              <a:t>07/03/2024</a:t>
             </a:fld>
             <a:endParaRPr lang="en-GB"/>
           </a:p>
@@ -461,7 +461,7 @@
           <a:p>
             <a:fld id="{0758383B-B3AB-4202-9ABE-1952F2F47594}" type="datetimeFigureOut">
               <a:rPr lang="en-GB" smtClean="0"/>
-              <a:t>22/02/2024</a:t>
+              <a:t>07/03/2024</a:t>
             </a:fld>
             <a:endParaRPr lang="en-GB"/>
           </a:p>
@@ -671,7 +671,7 @@
           <a:p>
             <a:fld id="{0758383B-B3AB-4202-9ABE-1952F2F47594}" type="datetimeFigureOut">
               <a:rPr lang="en-GB" smtClean="0"/>
-              <a:t>22/02/2024</a:t>
+              <a:t>07/03/2024</a:t>
             </a:fld>
             <a:endParaRPr lang="en-GB"/>
           </a:p>
@@ -871,7 +871,7 @@
           <a:p>
             <a:fld id="{0758383B-B3AB-4202-9ABE-1952F2F47594}" type="datetimeFigureOut">
               <a:rPr lang="en-GB" smtClean="0"/>
-              <a:t>22/02/2024</a:t>
+              <a:t>07/03/2024</a:t>
             </a:fld>
             <a:endParaRPr lang="en-GB"/>
           </a:p>
@@ -1147,7 +1147,7 @@
           <a:p>
             <a:fld id="{0758383B-B3AB-4202-9ABE-1952F2F47594}" type="datetimeFigureOut">
               <a:rPr lang="en-GB" smtClean="0"/>
-              <a:t>22/02/2024</a:t>
+              <a:t>07/03/2024</a:t>
             </a:fld>
             <a:endParaRPr lang="en-GB"/>
           </a:p>
@@ -1415,7 +1415,7 @@
           <a:p>
             <a:fld id="{0758383B-B3AB-4202-9ABE-1952F2F47594}" type="datetimeFigureOut">
               <a:rPr lang="en-GB" smtClean="0"/>
-              <a:t>22/02/2024</a:t>
+              <a:t>07/03/2024</a:t>
             </a:fld>
             <a:endParaRPr lang="en-GB"/>
           </a:p>
@@ -1830,7 +1830,7 @@
           <a:p>
             <a:fld id="{0758383B-B3AB-4202-9ABE-1952F2F47594}" type="datetimeFigureOut">
               <a:rPr lang="en-GB" smtClean="0"/>
-              <a:t>22/02/2024</a:t>
+              <a:t>07/03/2024</a:t>
             </a:fld>
             <a:endParaRPr lang="en-GB"/>
           </a:p>
@@ -1972,7 +1972,7 @@
           <a:p>
             <a:fld id="{0758383B-B3AB-4202-9ABE-1952F2F47594}" type="datetimeFigureOut">
               <a:rPr lang="en-GB" smtClean="0"/>
-              <a:t>22/02/2024</a:t>
+              <a:t>07/03/2024</a:t>
             </a:fld>
             <a:endParaRPr lang="en-GB"/>
           </a:p>
@@ -2085,7 +2085,7 @@
           <a:p>
             <a:fld id="{0758383B-B3AB-4202-9ABE-1952F2F47594}" type="datetimeFigureOut">
               <a:rPr lang="en-GB" smtClean="0"/>
-              <a:t>22/02/2024</a:t>
+              <a:t>07/03/2024</a:t>
             </a:fld>
             <a:endParaRPr lang="en-GB"/>
           </a:p>
@@ -2398,7 +2398,7 @@
           <a:p>
             <a:fld id="{0758383B-B3AB-4202-9ABE-1952F2F47594}" type="datetimeFigureOut">
               <a:rPr lang="en-GB" smtClean="0"/>
-              <a:t>22/02/2024</a:t>
+              <a:t>07/03/2024</a:t>
             </a:fld>
             <a:endParaRPr lang="en-GB"/>
           </a:p>
@@ -2687,7 +2687,7 @@
           <a:p>
             <a:fld id="{0758383B-B3AB-4202-9ABE-1952F2F47594}" type="datetimeFigureOut">
               <a:rPr lang="en-GB" smtClean="0"/>
-              <a:t>22/02/2024</a:t>
+              <a:t>07/03/2024</a:t>
             </a:fld>
             <a:endParaRPr lang="en-GB"/>
           </a:p>
@@ -2930,7 +2930,7 @@
           <a:p>
             <a:fld id="{0758383B-B3AB-4202-9ABE-1952F2F47594}" type="datetimeFigureOut">
               <a:rPr lang="en-GB" smtClean="0"/>
-              <a:t>22/02/2024</a:t>
+              <a:t>07/03/2024</a:t>
             </a:fld>
             <a:endParaRPr lang="en-GB"/>
           </a:p>
@@ -4056,11 +4056,11 @@
           <a:prstGeom prst="straightConnector1">
             <a:avLst/>
           </a:prstGeom>
-          <a:ln w="38100">
+          <a:ln w="47625" cmpd="dbl">
             <a:solidFill>
               <a:schemeClr val="tx1"/>
             </a:solidFill>
-            <a:prstDash val="sysDot"/>
+            <a:prstDash val="sysDash"/>
             <a:tailEnd type="triangle"/>
           </a:ln>
         </p:spPr>
@@ -5173,6 +5173,146 @@
           </a:p>
         </p:txBody>
       </p:sp>
+      <p:cxnSp>
+        <p:nvCxnSpPr>
+          <p:cNvPr id="2" name="Straight Arrow Connector 1">
+            <a:extLst>
+              <a:ext uri="{FF2B5EF4-FFF2-40B4-BE49-F238E27FC236}">
+                <a16:creationId xmlns:a16="http://schemas.microsoft.com/office/drawing/2014/main" id="{3C039A9F-8D91-F9BB-2D0C-580B01D537FE}"/>
+              </a:ext>
+            </a:extLst>
+          </p:cNvPr>
+          <p:cNvCxnSpPr>
+            <a:cxnSpLocks/>
+            <a:stCxn id="6" idx="4"/>
+            <a:endCxn id="9" idx="2"/>
+          </p:cNvCxnSpPr>
+          <p:nvPr/>
+        </p:nvCxnSpPr>
+        <p:spPr>
+          <a:xfrm>
+            <a:off x="2890221" y="2604047"/>
+            <a:ext cx="1456142" cy="1200323"/>
+          </a:xfrm>
+          <a:prstGeom prst="straightConnector1">
+            <a:avLst/>
+          </a:prstGeom>
+          <a:ln w="38100">
+            <a:solidFill>
+              <a:schemeClr val="tx1"/>
+            </a:solidFill>
+            <a:prstDash val="sysDot"/>
+            <a:tailEnd type="triangle"/>
+          </a:ln>
+        </p:spPr>
+        <p:style>
+          <a:lnRef idx="1">
+            <a:schemeClr val="accent1"/>
+          </a:lnRef>
+          <a:fillRef idx="0">
+            <a:schemeClr val="accent1"/>
+          </a:fillRef>
+          <a:effectRef idx="0">
+            <a:schemeClr val="accent1"/>
+          </a:effectRef>
+          <a:fontRef idx="minor">
+            <a:schemeClr val="tx1"/>
+          </a:fontRef>
+        </p:style>
+      </p:cxnSp>
+      <p:cxnSp>
+        <p:nvCxnSpPr>
+          <p:cNvPr id="8" name="Straight Arrow Connector 7">
+            <a:extLst>
+              <a:ext uri="{FF2B5EF4-FFF2-40B4-BE49-F238E27FC236}">
+                <a16:creationId xmlns:a16="http://schemas.microsoft.com/office/drawing/2014/main" id="{9CA937E9-D2C6-E42B-0BCC-EF3D36B9C8C6}"/>
+              </a:ext>
+            </a:extLst>
+          </p:cNvPr>
+          <p:cNvCxnSpPr>
+            <a:cxnSpLocks/>
+            <a:endCxn id="4" idx="2"/>
+          </p:cNvCxnSpPr>
+          <p:nvPr/>
+        </p:nvCxnSpPr>
+        <p:spPr>
+          <a:xfrm flipV="1">
+            <a:off x="2890221" y="2356236"/>
+            <a:ext cx="839922" cy="247811"/>
+          </a:xfrm>
+          <a:prstGeom prst="straightConnector1">
+            <a:avLst/>
+          </a:prstGeom>
+          <a:ln w="38100">
+            <a:solidFill>
+              <a:schemeClr val="tx1"/>
+            </a:solidFill>
+            <a:prstDash val="sysDot"/>
+            <a:tailEnd type="triangle"/>
+          </a:ln>
+        </p:spPr>
+        <p:style>
+          <a:lnRef idx="1">
+            <a:schemeClr val="accent1"/>
+          </a:lnRef>
+          <a:fillRef idx="0">
+            <a:schemeClr val="accent1"/>
+          </a:fillRef>
+          <a:effectRef idx="0">
+            <a:schemeClr val="accent1"/>
+          </a:effectRef>
+          <a:fontRef idx="minor">
+            <a:schemeClr val="tx1"/>
+          </a:fontRef>
+        </p:style>
+      </p:cxnSp>
+      <p:cxnSp>
+        <p:nvCxnSpPr>
+          <p:cNvPr id="16" name="Straight Arrow Connector 15">
+            <a:extLst>
+              <a:ext uri="{FF2B5EF4-FFF2-40B4-BE49-F238E27FC236}">
+                <a16:creationId xmlns:a16="http://schemas.microsoft.com/office/drawing/2014/main" id="{5E48B51D-4239-706A-A153-E155B5702DB6}"/>
+              </a:ext>
+            </a:extLst>
+          </p:cNvPr>
+          <p:cNvCxnSpPr>
+            <a:cxnSpLocks/>
+            <a:stCxn id="6" idx="4"/>
+            <a:endCxn id="10" idx="2"/>
+          </p:cNvCxnSpPr>
+          <p:nvPr/>
+        </p:nvCxnSpPr>
+        <p:spPr>
+          <a:xfrm>
+            <a:off x="2890221" y="2604047"/>
+            <a:ext cx="1643334" cy="316234"/>
+          </a:xfrm>
+          <a:prstGeom prst="straightConnector1">
+            <a:avLst/>
+          </a:prstGeom>
+          <a:ln w="38100">
+            <a:solidFill>
+              <a:schemeClr val="tx1"/>
+            </a:solidFill>
+            <a:prstDash val="sysDot"/>
+            <a:tailEnd type="triangle"/>
+          </a:ln>
+        </p:spPr>
+        <p:style>
+          <a:lnRef idx="1">
+            <a:schemeClr val="accent1"/>
+          </a:lnRef>
+          <a:fillRef idx="0">
+            <a:schemeClr val="accent1"/>
+          </a:fillRef>
+          <a:effectRef idx="0">
+            <a:schemeClr val="accent1"/>
+          </a:effectRef>
+          <a:fontRef idx="minor">
+            <a:schemeClr val="tx1"/>
+          </a:fontRef>
+        </p:style>
+      </p:cxnSp>
     </p:spTree>
     <p:extLst>
       <p:ext uri="{BB962C8B-B14F-4D97-AF65-F5344CB8AC3E}">

</xml_diff>